<commit_message>
update use case diagram
</commit_message>
<xml_diff>
--- a/Lab Submissions/Mid eval presentation.pptx
+++ b/Lab Submissions/Mid eval presentation.pptx
@@ -189,7 +189,7 @@
           <a:noFill/>
           <a:extLst>
             <a:ext uri="{909E8E84-426E-40dd-AFC4-6F175D3DCCD1}">
-              <a14:hiddenFill xmlns:a14="http://schemas.microsoft.com/office/drawing/2010/main" xmlns="">
+              <a14:hiddenFill xmlns="" xmlns:a14="http://schemas.microsoft.com/office/drawing/2010/main">
                 <a:solidFill>
                   <a:srgbClr val="FFFFFF"/>
                 </a:solidFill>
@@ -248,7 +248,7 @@
             </a:ln>
             <a:extLst>
               <a:ext uri="{91240B29-F687-4f45-9708-019B960494DF}">
-                <a14:hiddenLine xmlns:a14="http://schemas.microsoft.com/office/drawing/2010/main" xmlns="" w="9525">
+                <a14:hiddenLine xmlns="" xmlns:a14="http://schemas.microsoft.com/office/drawing/2010/main" w="9525">
                   <a:solidFill>
                     <a:srgbClr val="000000"/>
                   </a:solidFill>
@@ -338,7 +338,7 @@
             </a:ln>
             <a:extLst>
               <a:ext uri="{91240B29-F687-4f45-9708-019B960494DF}">
-                <a14:hiddenLine xmlns:a14="http://schemas.microsoft.com/office/drawing/2010/main" xmlns="" w="9525">
+                <a14:hiddenLine xmlns="" xmlns:a14="http://schemas.microsoft.com/office/drawing/2010/main" w="9525">
                   <a:solidFill>
                     <a:srgbClr val="000000"/>
                   </a:solidFill>
@@ -428,7 +428,7 @@
             </a:ln>
             <a:extLst>
               <a:ext uri="{91240B29-F687-4f45-9708-019B960494DF}">
-                <a14:hiddenLine xmlns:a14="http://schemas.microsoft.com/office/drawing/2010/main" xmlns="" w="9525">
+                <a14:hiddenLine xmlns="" xmlns:a14="http://schemas.microsoft.com/office/drawing/2010/main" w="9525">
                   <a:solidFill>
                     <a:srgbClr val="000000"/>
                   </a:solidFill>
@@ -462,7 +462,7 @@
             </a:ln>
             <a:extLst>
               <a:ext uri="{91240B29-F687-4f45-9708-019B960494DF}">
-                <a14:hiddenLine xmlns:a14="http://schemas.microsoft.com/office/drawing/2010/main" xmlns="" w="9525">
+                <a14:hiddenLine xmlns="" xmlns:a14="http://schemas.microsoft.com/office/drawing/2010/main" w="9525">
                   <a:solidFill>
                     <a:srgbClr val="000000"/>
                   </a:solidFill>
@@ -552,7 +552,7 @@
             </a:ln>
             <a:extLst>
               <a:ext uri="{91240B29-F687-4f45-9708-019B960494DF}">
-                <a14:hiddenLine xmlns:a14="http://schemas.microsoft.com/office/drawing/2010/main" xmlns="" w="9525">
+                <a14:hiddenLine xmlns="" xmlns:a14="http://schemas.microsoft.com/office/drawing/2010/main" w="9525">
                   <a:solidFill>
                     <a:srgbClr val="000000"/>
                   </a:solidFill>
@@ -614,7 +614,7 @@
             </a:ln>
             <a:extLst>
               <a:ext uri="{91240B29-F687-4f45-9708-019B960494DF}">
-                <a14:hiddenLine xmlns:a14="http://schemas.microsoft.com/office/drawing/2010/main" xmlns="" w="9525">
+                <a14:hiddenLine xmlns="" xmlns:a14="http://schemas.microsoft.com/office/drawing/2010/main" w="9525">
                   <a:solidFill>
                     <a:srgbClr val="000000"/>
                   </a:solidFill>
@@ -676,7 +676,7 @@
             </a:ln>
             <a:extLst>
               <a:ext uri="{91240B29-F687-4f45-9708-019B960494DF}">
-                <a14:hiddenLine xmlns:a14="http://schemas.microsoft.com/office/drawing/2010/main" xmlns="" w="9525">
+                <a14:hiddenLine xmlns="" xmlns:a14="http://schemas.microsoft.com/office/drawing/2010/main" w="9525">
                   <a:solidFill>
                     <a:srgbClr val="000000"/>
                   </a:solidFill>
@@ -766,7 +766,7 @@
             </a:ln>
             <a:extLst>
               <a:ext uri="{91240B29-F687-4f45-9708-019B960494DF}">
-                <a14:hiddenLine xmlns:a14="http://schemas.microsoft.com/office/drawing/2010/main" xmlns="" w="9525">
+                <a14:hiddenLine xmlns="" xmlns:a14="http://schemas.microsoft.com/office/drawing/2010/main" w="9525">
                   <a:solidFill>
                     <a:srgbClr val="000000"/>
                   </a:solidFill>
@@ -828,7 +828,7 @@
             </a:ln>
             <a:extLst>
               <a:ext uri="{91240B29-F687-4f45-9708-019B960494DF}">
-                <a14:hiddenLine xmlns:a14="http://schemas.microsoft.com/office/drawing/2010/main" xmlns="" w="9525">
+                <a14:hiddenLine xmlns="" xmlns:a14="http://schemas.microsoft.com/office/drawing/2010/main" w="9525">
                   <a:solidFill>
                     <a:srgbClr val="000000"/>
                   </a:solidFill>
@@ -890,7 +890,7 @@
             </a:ln>
             <a:extLst>
               <a:ext uri="{91240B29-F687-4f45-9708-019B960494DF}">
-                <a14:hiddenLine xmlns:a14="http://schemas.microsoft.com/office/drawing/2010/main" xmlns="" w="9525">
+                <a14:hiddenLine xmlns="" xmlns:a14="http://schemas.microsoft.com/office/drawing/2010/main" w="9525">
                   <a:solidFill>
                     <a:srgbClr val="000000"/>
                   </a:solidFill>
@@ -980,7 +980,7 @@
             </a:ln>
             <a:extLst>
               <a:ext uri="{91240B29-F687-4f45-9708-019B960494DF}">
-                <a14:hiddenLine xmlns:a14="http://schemas.microsoft.com/office/drawing/2010/main" xmlns="" w="9525">
+                <a14:hiddenLine xmlns="" xmlns:a14="http://schemas.microsoft.com/office/drawing/2010/main" w="9525">
                   <a:solidFill>
                     <a:srgbClr val="000000"/>
                   </a:solidFill>
@@ -1070,7 +1070,7 @@
             </a:ln>
             <a:extLst>
               <a:ext uri="{91240B29-F687-4f45-9708-019B960494DF}">
-                <a14:hiddenLine xmlns:a14="http://schemas.microsoft.com/office/drawing/2010/main" xmlns="" w="9525">
+                <a14:hiddenLine xmlns="" xmlns:a14="http://schemas.microsoft.com/office/drawing/2010/main" w="9525">
                   <a:solidFill>
                     <a:srgbClr val="000000"/>
                   </a:solidFill>
@@ -1132,7 +1132,7 @@
             </a:ln>
             <a:extLst>
               <a:ext uri="{91240B29-F687-4f45-9708-019B960494DF}">
-                <a14:hiddenLine xmlns:a14="http://schemas.microsoft.com/office/drawing/2010/main" xmlns="" w="9525">
+                <a14:hiddenLine xmlns="" xmlns:a14="http://schemas.microsoft.com/office/drawing/2010/main" w="9525">
                   <a:solidFill>
                     <a:srgbClr val="000000"/>
                   </a:solidFill>
@@ -1242,7 +1242,7 @@
             </a:ln>
             <a:extLst>
               <a:ext uri="{91240B29-F687-4f45-9708-019B960494DF}">
-                <a14:hiddenLine xmlns:a14="http://schemas.microsoft.com/office/drawing/2010/main" xmlns="" w="9525">
+                <a14:hiddenLine xmlns="" xmlns:a14="http://schemas.microsoft.com/office/drawing/2010/main" w="9525">
                   <a:solidFill>
                     <a:srgbClr val="000000"/>
                   </a:solidFill>
@@ -1304,7 +1304,7 @@
             </a:ln>
             <a:extLst>
               <a:ext uri="{91240B29-F687-4f45-9708-019B960494DF}">
-                <a14:hiddenLine xmlns:a14="http://schemas.microsoft.com/office/drawing/2010/main" xmlns="" w="9525">
+                <a14:hiddenLine xmlns="" xmlns:a14="http://schemas.microsoft.com/office/drawing/2010/main" w="9525">
                   <a:solidFill>
                     <a:srgbClr val="000000"/>
                   </a:solidFill>
@@ -1394,7 +1394,7 @@
             </a:ln>
             <a:extLst>
               <a:ext uri="{91240B29-F687-4f45-9708-019B960494DF}">
-                <a14:hiddenLine xmlns:a14="http://schemas.microsoft.com/office/drawing/2010/main" xmlns="" w="9525">
+                <a14:hiddenLine xmlns="" xmlns:a14="http://schemas.microsoft.com/office/drawing/2010/main" w="9525">
                   <a:solidFill>
                     <a:srgbClr val="000000"/>
                   </a:solidFill>
@@ -1484,7 +1484,7 @@
             </a:ln>
             <a:extLst>
               <a:ext uri="{91240B29-F687-4f45-9708-019B960494DF}">
-                <a14:hiddenLine xmlns:a14="http://schemas.microsoft.com/office/drawing/2010/main" xmlns="" w="9525">
+                <a14:hiddenLine xmlns="" xmlns:a14="http://schemas.microsoft.com/office/drawing/2010/main" w="9525">
                   <a:solidFill>
                     <a:srgbClr val="000000"/>
                   </a:solidFill>
@@ -1546,7 +1546,7 @@
             </a:ln>
             <a:extLst>
               <a:ext uri="{91240B29-F687-4f45-9708-019B960494DF}">
-                <a14:hiddenLine xmlns:a14="http://schemas.microsoft.com/office/drawing/2010/main" xmlns="" w="9525">
+                <a14:hiddenLine xmlns="" xmlns:a14="http://schemas.microsoft.com/office/drawing/2010/main" w="9525">
                   <a:solidFill>
                     <a:srgbClr val="000000"/>
                   </a:solidFill>
@@ -1636,7 +1636,7 @@
             </a:ln>
             <a:extLst>
               <a:ext uri="{91240B29-F687-4f45-9708-019B960494DF}">
-                <a14:hiddenLine xmlns:a14="http://schemas.microsoft.com/office/drawing/2010/main" xmlns="" w="9525">
+                <a14:hiddenLine xmlns="" xmlns:a14="http://schemas.microsoft.com/office/drawing/2010/main" w="9525">
                   <a:solidFill>
                     <a:srgbClr val="000000"/>
                   </a:solidFill>
@@ -1726,7 +1726,7 @@
             </a:ln>
             <a:extLst>
               <a:ext uri="{91240B29-F687-4f45-9708-019B960494DF}">
-                <a14:hiddenLine xmlns:a14="http://schemas.microsoft.com/office/drawing/2010/main" xmlns="" w="9525">
+                <a14:hiddenLine xmlns="" xmlns:a14="http://schemas.microsoft.com/office/drawing/2010/main" w="9525">
                   <a:solidFill>
                     <a:srgbClr val="000000"/>
                   </a:solidFill>
@@ -1782,7 +1782,7 @@
             </a:ln>
             <a:extLst>
               <a:ext uri="{91240B29-F687-4f45-9708-019B960494DF}">
-                <a14:hiddenLine xmlns:a14="http://schemas.microsoft.com/office/drawing/2010/main" xmlns="" w="9525">
+                <a14:hiddenLine xmlns="" xmlns:a14="http://schemas.microsoft.com/office/drawing/2010/main" w="9525">
                   <a:solidFill>
                     <a:srgbClr val="000000"/>
                   </a:solidFill>
@@ -1872,7 +1872,7 @@
             </a:ln>
             <a:extLst>
               <a:ext uri="{91240B29-F687-4f45-9708-019B960494DF}">
-                <a14:hiddenLine xmlns:a14="http://schemas.microsoft.com/office/drawing/2010/main" xmlns="" w="9525">
+                <a14:hiddenLine xmlns="" xmlns:a14="http://schemas.microsoft.com/office/drawing/2010/main" w="9525">
                   <a:solidFill>
                     <a:srgbClr val="000000"/>
                   </a:solidFill>
@@ -1928,7 +1928,7 @@
             </a:ln>
             <a:extLst>
               <a:ext uri="{91240B29-F687-4f45-9708-019B960494DF}">
-                <a14:hiddenLine xmlns:a14="http://schemas.microsoft.com/office/drawing/2010/main" xmlns="" w="9525">
+                <a14:hiddenLine xmlns="" xmlns:a14="http://schemas.microsoft.com/office/drawing/2010/main" w="9525">
                   <a:solidFill>
                     <a:srgbClr val="000000"/>
                   </a:solidFill>
@@ -2018,7 +2018,7 @@
             </a:ln>
             <a:extLst>
               <a:ext uri="{91240B29-F687-4f45-9708-019B960494DF}">
-                <a14:hiddenLine xmlns:a14="http://schemas.microsoft.com/office/drawing/2010/main" xmlns="" w="9525">
+                <a14:hiddenLine xmlns="" xmlns:a14="http://schemas.microsoft.com/office/drawing/2010/main" w="9525">
                   <a:solidFill>
                     <a:srgbClr val="000000"/>
                   </a:solidFill>
@@ -2086,7 +2086,7 @@
             </a:ln>
             <a:extLst>
               <a:ext uri="{91240B29-F687-4f45-9708-019B960494DF}">
-                <a14:hiddenLine xmlns:a14="http://schemas.microsoft.com/office/drawing/2010/main" xmlns="" w="9525">
+                <a14:hiddenLine xmlns="" xmlns:a14="http://schemas.microsoft.com/office/drawing/2010/main" w="9525">
                   <a:solidFill>
                     <a:srgbClr val="000000"/>
                   </a:solidFill>
@@ -2176,7 +2176,7 @@
             </a:ln>
             <a:extLst>
               <a:ext uri="{91240B29-F687-4f45-9708-019B960494DF}">
-                <a14:hiddenLine xmlns:a14="http://schemas.microsoft.com/office/drawing/2010/main" xmlns="" w="9525">
+                <a14:hiddenLine xmlns="" xmlns:a14="http://schemas.microsoft.com/office/drawing/2010/main" w="9525">
                   <a:solidFill>
                     <a:srgbClr val="000000"/>
                   </a:solidFill>
@@ -2244,7 +2244,7 @@
             </a:ln>
             <a:extLst>
               <a:ext uri="{91240B29-F687-4f45-9708-019B960494DF}">
-                <a14:hiddenLine xmlns:a14="http://schemas.microsoft.com/office/drawing/2010/main" xmlns="" w="9525">
+                <a14:hiddenLine xmlns="" xmlns:a14="http://schemas.microsoft.com/office/drawing/2010/main" w="9525">
                   <a:solidFill>
                     <a:srgbClr val="000000"/>
                   </a:solidFill>
@@ -2334,7 +2334,7 @@
             </a:ln>
             <a:extLst>
               <a:ext uri="{91240B29-F687-4f45-9708-019B960494DF}">
-                <a14:hiddenLine xmlns:a14="http://schemas.microsoft.com/office/drawing/2010/main" xmlns="" w="9525">
+                <a14:hiddenLine xmlns="" xmlns:a14="http://schemas.microsoft.com/office/drawing/2010/main" w="9525">
                   <a:solidFill>
                     <a:srgbClr val="000000"/>
                   </a:solidFill>
@@ -2368,7 +2368,7 @@
             </a:ln>
             <a:extLst>
               <a:ext uri="{91240B29-F687-4f45-9708-019B960494DF}">
-                <a14:hiddenLine xmlns:a14="http://schemas.microsoft.com/office/drawing/2010/main" xmlns="" w="9525">
+                <a14:hiddenLine xmlns="" xmlns:a14="http://schemas.microsoft.com/office/drawing/2010/main" w="9525">
                   <a:solidFill>
                     <a:srgbClr val="000000"/>
                   </a:solidFill>
@@ -2458,7 +2458,7 @@
             </a:ln>
             <a:extLst>
               <a:ext uri="{91240B29-F687-4f45-9708-019B960494DF}">
-                <a14:hiddenLine xmlns:a14="http://schemas.microsoft.com/office/drawing/2010/main" xmlns="" w="9525">
+                <a14:hiddenLine xmlns="" xmlns:a14="http://schemas.microsoft.com/office/drawing/2010/main" w="9525">
                   <a:solidFill>
                     <a:srgbClr val="000000"/>
                   </a:solidFill>
@@ -2520,7 +2520,7 @@
             </a:ln>
             <a:extLst>
               <a:ext uri="{91240B29-F687-4f45-9708-019B960494DF}">
-                <a14:hiddenLine xmlns:a14="http://schemas.microsoft.com/office/drawing/2010/main" xmlns="" w="9525">
+                <a14:hiddenLine xmlns="" xmlns:a14="http://schemas.microsoft.com/office/drawing/2010/main" w="9525">
                   <a:solidFill>
                     <a:srgbClr val="000000"/>
                   </a:solidFill>
@@ -2582,7 +2582,7 @@
             </a:ln>
             <a:extLst>
               <a:ext uri="{91240B29-F687-4f45-9708-019B960494DF}">
-                <a14:hiddenLine xmlns:a14="http://schemas.microsoft.com/office/drawing/2010/main" xmlns="" w="9525">
+                <a14:hiddenLine xmlns="" xmlns:a14="http://schemas.microsoft.com/office/drawing/2010/main" w="9525">
                   <a:solidFill>
                     <a:srgbClr val="000000"/>
                   </a:solidFill>
@@ -2672,7 +2672,7 @@
             </a:ln>
             <a:extLst>
               <a:ext uri="{91240B29-F687-4f45-9708-019B960494DF}">
-                <a14:hiddenLine xmlns:a14="http://schemas.microsoft.com/office/drawing/2010/main" xmlns="" w="9525">
+                <a14:hiddenLine xmlns="" xmlns:a14="http://schemas.microsoft.com/office/drawing/2010/main" w="9525">
                   <a:solidFill>
                     <a:srgbClr val="000000"/>
                   </a:solidFill>
@@ -2740,7 +2740,7 @@
             </a:ln>
             <a:extLst>
               <a:ext uri="{91240B29-F687-4f45-9708-019B960494DF}">
-                <a14:hiddenLine xmlns:a14="http://schemas.microsoft.com/office/drawing/2010/main" xmlns="" w="9525">
+                <a14:hiddenLine xmlns="" xmlns:a14="http://schemas.microsoft.com/office/drawing/2010/main" w="9525">
                   <a:solidFill>
                     <a:srgbClr val="000000"/>
                   </a:solidFill>
@@ -2802,7 +2802,7 @@
             </a:ln>
             <a:extLst>
               <a:ext uri="{91240B29-F687-4f45-9708-019B960494DF}">
-                <a14:hiddenLine xmlns:a14="http://schemas.microsoft.com/office/drawing/2010/main" xmlns="" w="9525">
+                <a14:hiddenLine xmlns="" xmlns:a14="http://schemas.microsoft.com/office/drawing/2010/main" w="9525">
                   <a:solidFill>
                     <a:srgbClr val="000000"/>
                   </a:solidFill>
@@ -2892,7 +2892,7 @@
             </a:ln>
             <a:extLst>
               <a:ext uri="{91240B29-F687-4f45-9708-019B960494DF}">
-                <a14:hiddenLine xmlns:a14="http://schemas.microsoft.com/office/drawing/2010/main" xmlns="" w="9525">
+                <a14:hiddenLine xmlns="" xmlns:a14="http://schemas.microsoft.com/office/drawing/2010/main" w="9525">
                   <a:solidFill>
                     <a:srgbClr val="000000"/>
                   </a:solidFill>
@@ -2954,7 +2954,7 @@
             </a:ln>
             <a:extLst>
               <a:ext uri="{91240B29-F687-4f45-9708-019B960494DF}">
-                <a14:hiddenLine xmlns:a14="http://schemas.microsoft.com/office/drawing/2010/main" xmlns="" w="9525">
+                <a14:hiddenLine xmlns="" xmlns:a14="http://schemas.microsoft.com/office/drawing/2010/main" w="9525">
                   <a:solidFill>
                     <a:srgbClr val="000000"/>
                   </a:solidFill>
@@ -3044,7 +3044,7 @@
             </a:ln>
             <a:extLst>
               <a:ext uri="{91240B29-F687-4f45-9708-019B960494DF}">
-                <a14:hiddenLine xmlns:a14="http://schemas.microsoft.com/office/drawing/2010/main" xmlns="" w="9525">
+                <a14:hiddenLine xmlns="" xmlns:a14="http://schemas.microsoft.com/office/drawing/2010/main" w="9525">
                   <a:solidFill>
                     <a:srgbClr val="000000"/>
                   </a:solidFill>
@@ -3106,7 +3106,7 @@
             </a:ln>
             <a:extLst>
               <a:ext uri="{91240B29-F687-4f45-9708-019B960494DF}">
-                <a14:hiddenLine xmlns:a14="http://schemas.microsoft.com/office/drawing/2010/main" xmlns="" w="9525">
+                <a14:hiddenLine xmlns="" xmlns:a14="http://schemas.microsoft.com/office/drawing/2010/main" w="9525">
                   <a:solidFill>
                     <a:srgbClr val="000000"/>
                   </a:solidFill>
@@ -3196,7 +3196,7 @@
             </a:ln>
             <a:extLst>
               <a:ext uri="{91240B29-F687-4f45-9708-019B960494DF}">
-                <a14:hiddenLine xmlns:a14="http://schemas.microsoft.com/office/drawing/2010/main" xmlns="" w="9525">
+                <a14:hiddenLine xmlns="" xmlns:a14="http://schemas.microsoft.com/office/drawing/2010/main" w="9525">
                   <a:solidFill>
                     <a:srgbClr val="000000"/>
                   </a:solidFill>
@@ -3230,7 +3230,7 @@
             </a:ln>
             <a:extLst>
               <a:ext uri="{91240B29-F687-4f45-9708-019B960494DF}">
-                <a14:hiddenLine xmlns:a14="http://schemas.microsoft.com/office/drawing/2010/main" xmlns="" w="9525">
+                <a14:hiddenLine xmlns="" xmlns:a14="http://schemas.microsoft.com/office/drawing/2010/main" w="9525">
                   <a:solidFill>
                     <a:srgbClr val="000000"/>
                   </a:solidFill>
@@ -3295,7 +3295,7 @@
             </a:ln>
             <a:extLst>
               <a:ext uri="{91240B29-F687-4f45-9708-019B960494DF}">
-                <a14:hiddenLine xmlns:a14="http://schemas.microsoft.com/office/drawing/2010/main" xmlns="" w="9525">
+                <a14:hiddenLine xmlns="" xmlns:a14="http://schemas.microsoft.com/office/drawing/2010/main" w="9525">
                   <a:solidFill>
                     <a:srgbClr val="000000"/>
                   </a:solidFill>
@@ -3385,7 +3385,7 @@
             </a:ln>
             <a:extLst>
               <a:ext uri="{91240B29-F687-4f45-9708-019B960494DF}">
-                <a14:hiddenLine xmlns:a14="http://schemas.microsoft.com/office/drawing/2010/main" xmlns="" w="9525">
+                <a14:hiddenLine xmlns="" xmlns:a14="http://schemas.microsoft.com/office/drawing/2010/main" w="9525">
                   <a:solidFill>
                     <a:srgbClr val="000000"/>
                   </a:solidFill>
@@ -3447,7 +3447,7 @@
             </a:ln>
             <a:extLst>
               <a:ext uri="{91240B29-F687-4f45-9708-019B960494DF}">
-                <a14:hiddenLine xmlns:a14="http://schemas.microsoft.com/office/drawing/2010/main" xmlns="" w="9525">
+                <a14:hiddenLine xmlns="" xmlns:a14="http://schemas.microsoft.com/office/drawing/2010/main" w="9525">
                   <a:solidFill>
                     <a:srgbClr val="000000"/>
                   </a:solidFill>
@@ -3537,7 +3537,7 @@
             </a:ln>
             <a:extLst>
               <a:ext uri="{91240B29-F687-4f45-9708-019B960494DF}">
-                <a14:hiddenLine xmlns:a14="http://schemas.microsoft.com/office/drawing/2010/main" xmlns="" w="9525">
+                <a14:hiddenLine xmlns="" xmlns:a14="http://schemas.microsoft.com/office/drawing/2010/main" w="9525">
                   <a:solidFill>
                     <a:srgbClr val="000000"/>
                   </a:solidFill>
@@ -3627,7 +3627,7 @@
             </a:ln>
             <a:extLst>
               <a:ext uri="{91240B29-F687-4f45-9708-019B960494DF}">
-                <a14:hiddenLine xmlns:a14="http://schemas.microsoft.com/office/drawing/2010/main" xmlns="" w="9525">
+                <a14:hiddenLine xmlns="" xmlns:a14="http://schemas.microsoft.com/office/drawing/2010/main" w="9525">
                   <a:solidFill>
                     <a:srgbClr val="000000"/>
                   </a:solidFill>
@@ -3692,7 +3692,7 @@
             </a:ln>
             <a:extLst>
               <a:ext uri="{91240B29-F687-4f45-9708-019B960494DF}">
-                <a14:hiddenLine xmlns:a14="http://schemas.microsoft.com/office/drawing/2010/main" xmlns="" w="9525">
+                <a14:hiddenLine xmlns="" xmlns:a14="http://schemas.microsoft.com/office/drawing/2010/main" w="9525">
                   <a:solidFill>
                     <a:srgbClr val="000000"/>
                   </a:solidFill>
@@ -3754,7 +3754,7 @@
             </a:ln>
             <a:extLst>
               <a:ext uri="{91240B29-F687-4f45-9708-019B960494DF}">
-                <a14:hiddenLine xmlns:a14="http://schemas.microsoft.com/office/drawing/2010/main" xmlns="" w="9525">
+                <a14:hiddenLine xmlns="" xmlns:a14="http://schemas.microsoft.com/office/drawing/2010/main" w="9525">
                   <a:solidFill>
                     <a:srgbClr val="000000"/>
                   </a:solidFill>
@@ -3844,7 +3844,7 @@
             </a:ln>
             <a:extLst>
               <a:ext uri="{91240B29-F687-4f45-9708-019B960494DF}">
-                <a14:hiddenLine xmlns:a14="http://schemas.microsoft.com/office/drawing/2010/main" xmlns="" w="9525">
+                <a14:hiddenLine xmlns="" xmlns:a14="http://schemas.microsoft.com/office/drawing/2010/main" w="9525">
                   <a:solidFill>
                     <a:srgbClr val="000000"/>
                   </a:solidFill>
@@ -3934,7 +3934,7 @@
             </a:ln>
             <a:extLst>
               <a:ext uri="{91240B29-F687-4f45-9708-019B960494DF}">
-                <a14:hiddenLine xmlns:a14="http://schemas.microsoft.com/office/drawing/2010/main" xmlns="" w="9525">
+                <a14:hiddenLine xmlns="" xmlns:a14="http://schemas.microsoft.com/office/drawing/2010/main" w="9525">
                   <a:solidFill>
                     <a:srgbClr val="000000"/>
                   </a:solidFill>
@@ -3996,7 +3996,7 @@
             </a:ln>
             <a:extLst>
               <a:ext uri="{91240B29-F687-4f45-9708-019B960494DF}">
-                <a14:hiddenLine xmlns:a14="http://schemas.microsoft.com/office/drawing/2010/main" xmlns="" w="9525">
+                <a14:hiddenLine xmlns="" xmlns:a14="http://schemas.microsoft.com/office/drawing/2010/main" w="9525">
                   <a:solidFill>
                     <a:srgbClr val="000000"/>
                   </a:solidFill>
@@ -4116,7 +4116,7 @@
             </a:ln>
             <a:extLst>
               <a:ext uri="{91240B29-F687-4f45-9708-019B960494DF}">
-                <a14:hiddenLine xmlns:a14="http://schemas.microsoft.com/office/drawing/2010/main" xmlns="" w="9525">
+                <a14:hiddenLine xmlns="" xmlns:a14="http://schemas.microsoft.com/office/drawing/2010/main" w="9525">
                   <a:solidFill>
                     <a:srgbClr val="000000"/>
                   </a:solidFill>
@@ -4184,7 +4184,7 @@
             </a:ln>
             <a:extLst>
               <a:ext uri="{91240B29-F687-4f45-9708-019B960494DF}">
-                <a14:hiddenLine xmlns:a14="http://schemas.microsoft.com/office/drawing/2010/main" xmlns="" w="9525">
+                <a14:hiddenLine xmlns="" xmlns:a14="http://schemas.microsoft.com/office/drawing/2010/main" w="9525">
                   <a:solidFill>
                     <a:srgbClr val="000000"/>
                   </a:solidFill>
@@ -4274,7 +4274,7 @@
             </a:ln>
             <a:extLst>
               <a:ext uri="{91240B29-F687-4f45-9708-019B960494DF}">
-                <a14:hiddenLine xmlns:a14="http://schemas.microsoft.com/office/drawing/2010/main" xmlns="" w="9525">
+                <a14:hiddenLine xmlns="" xmlns:a14="http://schemas.microsoft.com/office/drawing/2010/main" w="9525">
                   <a:solidFill>
                     <a:srgbClr val="000000"/>
                   </a:solidFill>
@@ -9003,7 +9003,7 @@
           <a:noFill/>
           <a:extLst>
             <a:ext uri="{909E8E84-426E-40dd-AFC4-6F175D3DCCD1}">
-              <a14:hiddenFill xmlns:a14="http://schemas.microsoft.com/office/drawing/2010/main" xmlns="">
+              <a14:hiddenFill xmlns="" xmlns:a14="http://schemas.microsoft.com/office/drawing/2010/main">
                 <a:solidFill>
                   <a:srgbClr val="FFFFFF"/>
                 </a:solidFill>
@@ -9077,7 +9077,7 @@
               </a:ln>
               <a:extLst>
                 <a:ext uri="{91240B29-F687-4f45-9708-019B960494DF}">
-                  <a14:hiddenLine xmlns:a14="http://schemas.microsoft.com/office/drawing/2010/main" xmlns="" w="9525">
+                  <a14:hiddenLine xmlns="" xmlns:a14="http://schemas.microsoft.com/office/drawing/2010/main" w="9525">
                     <a:solidFill>
                       <a:srgbClr val="000000"/>
                     </a:solidFill>
@@ -9167,7 +9167,7 @@
               </a:ln>
               <a:extLst>
                 <a:ext uri="{91240B29-F687-4f45-9708-019B960494DF}">
-                  <a14:hiddenLine xmlns:a14="http://schemas.microsoft.com/office/drawing/2010/main" xmlns="" w="9525">
+                  <a14:hiddenLine xmlns="" xmlns:a14="http://schemas.microsoft.com/office/drawing/2010/main" w="9525">
                     <a:solidFill>
                       <a:srgbClr val="000000"/>
                     </a:solidFill>
@@ -9257,7 +9257,7 @@
               </a:ln>
               <a:extLst>
                 <a:ext uri="{91240B29-F687-4f45-9708-019B960494DF}">
-                  <a14:hiddenLine xmlns:a14="http://schemas.microsoft.com/office/drawing/2010/main" xmlns="" w="9525">
+                  <a14:hiddenLine xmlns="" xmlns:a14="http://schemas.microsoft.com/office/drawing/2010/main" w="9525">
                     <a:solidFill>
                       <a:srgbClr val="000000"/>
                     </a:solidFill>
@@ -9319,7 +9319,7 @@
               </a:ln>
               <a:extLst>
                 <a:ext uri="{91240B29-F687-4f45-9708-019B960494DF}">
-                  <a14:hiddenLine xmlns:a14="http://schemas.microsoft.com/office/drawing/2010/main" xmlns="" w="9525">
+                  <a14:hiddenLine xmlns="" xmlns:a14="http://schemas.microsoft.com/office/drawing/2010/main" w="9525">
                     <a:solidFill>
                       <a:srgbClr val="000000"/>
                     </a:solidFill>
@@ -9409,7 +9409,7 @@
               </a:ln>
               <a:extLst>
                 <a:ext uri="{91240B29-F687-4f45-9708-019B960494DF}">
-                  <a14:hiddenLine xmlns:a14="http://schemas.microsoft.com/office/drawing/2010/main" xmlns="" w="9525">
+                  <a14:hiddenLine xmlns="" xmlns:a14="http://schemas.microsoft.com/office/drawing/2010/main" w="9525">
                     <a:solidFill>
                       <a:srgbClr val="000000"/>
                     </a:solidFill>
@@ -9471,7 +9471,7 @@
               </a:ln>
               <a:extLst>
                 <a:ext uri="{91240B29-F687-4f45-9708-019B960494DF}">
-                  <a14:hiddenLine xmlns:a14="http://schemas.microsoft.com/office/drawing/2010/main" xmlns="" w="9525">
+                  <a14:hiddenLine xmlns="" xmlns:a14="http://schemas.microsoft.com/office/drawing/2010/main" w="9525">
                     <a:solidFill>
                       <a:srgbClr val="000000"/>
                     </a:solidFill>
@@ -9533,7 +9533,7 @@
               </a:ln>
               <a:extLst>
                 <a:ext uri="{91240B29-F687-4f45-9708-019B960494DF}">
-                  <a14:hiddenLine xmlns:a14="http://schemas.microsoft.com/office/drawing/2010/main" xmlns="" w="9525">
+                  <a14:hiddenLine xmlns="" xmlns:a14="http://schemas.microsoft.com/office/drawing/2010/main" w="9525">
                     <a:solidFill>
                       <a:srgbClr val="000000"/>
                     </a:solidFill>
@@ -9623,7 +9623,7 @@
               </a:ln>
               <a:extLst>
                 <a:ext uri="{91240B29-F687-4f45-9708-019B960494DF}">
-                  <a14:hiddenLine xmlns:a14="http://schemas.microsoft.com/office/drawing/2010/main" xmlns="" w="9525">
+                  <a14:hiddenLine xmlns="" xmlns:a14="http://schemas.microsoft.com/office/drawing/2010/main" w="9525">
                     <a:solidFill>
                       <a:srgbClr val="000000"/>
                     </a:solidFill>
@@ -9713,7 +9713,7 @@
               </a:ln>
               <a:extLst>
                 <a:ext uri="{91240B29-F687-4f45-9708-019B960494DF}">
-                  <a14:hiddenLine xmlns:a14="http://schemas.microsoft.com/office/drawing/2010/main" xmlns="" w="9525">
+                  <a14:hiddenLine xmlns="" xmlns:a14="http://schemas.microsoft.com/office/drawing/2010/main" w="9525">
                     <a:solidFill>
                       <a:srgbClr val="000000"/>
                     </a:solidFill>
@@ -9775,7 +9775,7 @@
               </a:ln>
               <a:extLst>
                 <a:ext uri="{91240B29-F687-4f45-9708-019B960494DF}">
-                  <a14:hiddenLine xmlns:a14="http://schemas.microsoft.com/office/drawing/2010/main" xmlns="" w="9525">
+                  <a14:hiddenLine xmlns="" xmlns:a14="http://schemas.microsoft.com/office/drawing/2010/main" w="9525">
                     <a:solidFill>
                       <a:srgbClr val="000000"/>
                     </a:solidFill>
@@ -9885,7 +9885,7 @@
               </a:ln>
               <a:extLst>
                 <a:ext uri="{91240B29-F687-4f45-9708-019B960494DF}">
-                  <a14:hiddenLine xmlns:a14="http://schemas.microsoft.com/office/drawing/2010/main" xmlns="" w="9525">
+                  <a14:hiddenLine xmlns="" xmlns:a14="http://schemas.microsoft.com/office/drawing/2010/main" w="9525">
                     <a:solidFill>
                       <a:srgbClr val="000000"/>
                     </a:solidFill>
@@ -9969,7 +9969,7 @@
               </a:ln>
               <a:extLst>
                 <a:ext uri="{91240B29-F687-4f45-9708-019B960494DF}">
-                  <a14:hiddenLine xmlns:a14="http://schemas.microsoft.com/office/drawing/2010/main" xmlns="" w="9525">
+                  <a14:hiddenLine xmlns="" xmlns:a14="http://schemas.microsoft.com/office/drawing/2010/main" w="9525">
                     <a:solidFill>
                       <a:srgbClr val="000000"/>
                     </a:solidFill>
@@ -10031,7 +10031,7 @@
               </a:ln>
               <a:extLst>
                 <a:ext uri="{91240B29-F687-4f45-9708-019B960494DF}">
-                  <a14:hiddenLine xmlns:a14="http://schemas.microsoft.com/office/drawing/2010/main" xmlns="" w="9525">
+                  <a14:hiddenLine xmlns="" xmlns:a14="http://schemas.microsoft.com/office/drawing/2010/main" w="9525">
                     <a:solidFill>
                       <a:srgbClr val="000000"/>
                     </a:solidFill>
@@ -10093,7 +10093,7 @@
               </a:ln>
               <a:extLst>
                 <a:ext uri="{91240B29-F687-4f45-9708-019B960494DF}">
-                  <a14:hiddenLine xmlns:a14="http://schemas.microsoft.com/office/drawing/2010/main" xmlns="" w="9525">
+                  <a14:hiddenLine xmlns="" xmlns:a14="http://schemas.microsoft.com/office/drawing/2010/main" w="9525">
                     <a:solidFill>
                       <a:srgbClr val="000000"/>
                     </a:solidFill>
@@ -10183,7 +10183,7 @@
               </a:ln>
               <a:extLst>
                 <a:ext uri="{91240B29-F687-4f45-9708-019B960494DF}">
-                  <a14:hiddenLine xmlns:a14="http://schemas.microsoft.com/office/drawing/2010/main" xmlns="" w="9525">
+                  <a14:hiddenLine xmlns="" xmlns:a14="http://schemas.microsoft.com/office/drawing/2010/main" w="9525">
                     <a:solidFill>
                       <a:srgbClr val="000000"/>
                     </a:solidFill>
@@ -10217,7 +10217,7 @@
               </a:ln>
               <a:extLst>
                 <a:ext uri="{91240B29-F687-4f45-9708-019B960494DF}">
-                  <a14:hiddenLine xmlns:a14="http://schemas.microsoft.com/office/drawing/2010/main" xmlns="" w="9525">
+                  <a14:hiddenLine xmlns="" xmlns:a14="http://schemas.microsoft.com/office/drawing/2010/main" w="9525">
                     <a:solidFill>
                       <a:srgbClr val="000000"/>
                     </a:solidFill>
@@ -10282,7 +10282,7 @@
               </a:ln>
               <a:extLst>
                 <a:ext uri="{91240B29-F687-4f45-9708-019B960494DF}">
-                  <a14:hiddenLine xmlns:a14="http://schemas.microsoft.com/office/drawing/2010/main" xmlns="" w="9525">
+                  <a14:hiddenLine xmlns="" xmlns:a14="http://schemas.microsoft.com/office/drawing/2010/main" w="9525">
                     <a:solidFill>
                       <a:srgbClr val="000000"/>
                     </a:solidFill>
@@ -10372,7 +10372,7 @@
               </a:ln>
               <a:extLst>
                 <a:ext uri="{91240B29-F687-4f45-9708-019B960494DF}">
-                  <a14:hiddenLine xmlns:a14="http://schemas.microsoft.com/office/drawing/2010/main" xmlns="" w="9525">
+                  <a14:hiddenLine xmlns="" xmlns:a14="http://schemas.microsoft.com/office/drawing/2010/main" w="9525">
                     <a:solidFill>
                       <a:srgbClr val="000000"/>
                     </a:solidFill>
@@ -10434,7 +10434,7 @@
               </a:ln>
               <a:extLst>
                 <a:ext uri="{91240B29-F687-4f45-9708-019B960494DF}">
-                  <a14:hiddenLine xmlns:a14="http://schemas.microsoft.com/office/drawing/2010/main" xmlns="" w="9525">
+                  <a14:hiddenLine xmlns="" xmlns:a14="http://schemas.microsoft.com/office/drawing/2010/main" w="9525">
                     <a:solidFill>
                       <a:srgbClr val="000000"/>
                     </a:solidFill>
@@ -10524,7 +10524,7 @@
               </a:ln>
               <a:extLst>
                 <a:ext uri="{91240B29-F687-4f45-9708-019B960494DF}">
-                  <a14:hiddenLine xmlns:a14="http://schemas.microsoft.com/office/drawing/2010/main" xmlns="" w="9525">
+                  <a14:hiddenLine xmlns="" xmlns:a14="http://schemas.microsoft.com/office/drawing/2010/main" w="9525">
                     <a:solidFill>
                       <a:srgbClr val="000000"/>
                     </a:solidFill>
@@ -10589,7 +10589,7 @@
               </a:ln>
               <a:extLst>
                 <a:ext uri="{91240B29-F687-4f45-9708-019B960494DF}">
-                  <a14:hiddenLine xmlns:a14="http://schemas.microsoft.com/office/drawing/2010/main" xmlns="" w="9525">
+                  <a14:hiddenLine xmlns="" xmlns:a14="http://schemas.microsoft.com/office/drawing/2010/main" w="9525">
                     <a:solidFill>
                       <a:srgbClr val="000000"/>
                     </a:solidFill>
@@ -10651,7 +10651,7 @@
               </a:ln>
               <a:extLst>
                 <a:ext uri="{91240B29-F687-4f45-9708-019B960494DF}">
-                  <a14:hiddenLine xmlns:a14="http://schemas.microsoft.com/office/drawing/2010/main" xmlns="" w="9525">
+                  <a14:hiddenLine xmlns="" xmlns:a14="http://schemas.microsoft.com/office/drawing/2010/main" w="9525">
                     <a:solidFill>
                       <a:srgbClr val="000000"/>
                     </a:solidFill>
@@ -10741,7 +10741,7 @@
               </a:ln>
               <a:extLst>
                 <a:ext uri="{91240B29-F687-4f45-9708-019B960494DF}">
-                  <a14:hiddenLine xmlns:a14="http://schemas.microsoft.com/office/drawing/2010/main" xmlns="" w="9525">
+                  <a14:hiddenLine xmlns="" xmlns:a14="http://schemas.microsoft.com/office/drawing/2010/main" w="9525">
                     <a:solidFill>
                       <a:srgbClr val="000000"/>
                     </a:solidFill>
@@ -10831,7 +10831,7 @@
               </a:ln>
               <a:extLst>
                 <a:ext uri="{91240B29-F687-4f45-9708-019B960494DF}">
-                  <a14:hiddenLine xmlns:a14="http://schemas.microsoft.com/office/drawing/2010/main" xmlns="" w="9525">
+                  <a14:hiddenLine xmlns="" xmlns:a14="http://schemas.microsoft.com/office/drawing/2010/main" w="9525">
                     <a:solidFill>
                       <a:srgbClr val="000000"/>
                     </a:solidFill>
@@ -10896,7 +10896,7 @@
               </a:ln>
               <a:extLst>
                 <a:ext uri="{91240B29-F687-4f45-9708-019B960494DF}">
-                  <a14:hiddenLine xmlns:a14="http://schemas.microsoft.com/office/drawing/2010/main" xmlns="" w="9525">
+                  <a14:hiddenLine xmlns="" xmlns:a14="http://schemas.microsoft.com/office/drawing/2010/main" w="9525">
                     <a:solidFill>
                       <a:srgbClr val="000000"/>
                     </a:solidFill>
@@ -11016,7 +11016,7 @@
               </a:ln>
               <a:extLst>
                 <a:ext uri="{91240B29-F687-4f45-9708-019B960494DF}">
-                  <a14:hiddenLine xmlns:a14="http://schemas.microsoft.com/office/drawing/2010/main" xmlns="" w="9525">
+                  <a14:hiddenLine xmlns="" xmlns:a14="http://schemas.microsoft.com/office/drawing/2010/main" w="9525">
                     <a:solidFill>
                       <a:srgbClr val="000000"/>
                     </a:solidFill>
@@ -11097,7 +11097,7 @@
               </a:ln>
               <a:extLst>
                 <a:ext uri="{91240B29-F687-4f45-9708-019B960494DF}">
-                  <a14:hiddenLine xmlns:a14="http://schemas.microsoft.com/office/drawing/2010/main" xmlns="" w="9525">
+                  <a14:hiddenLine xmlns="" xmlns:a14="http://schemas.microsoft.com/office/drawing/2010/main" w="9525">
                     <a:solidFill>
                       <a:srgbClr val="000000"/>
                     </a:solidFill>
@@ -11212,7 +11212,7 @@
               </a:ln>
               <a:extLst>
                 <a:ext uri="{91240B29-F687-4f45-9708-019B960494DF}">
-                  <a14:hiddenLine xmlns:a14="http://schemas.microsoft.com/office/drawing/2010/main" xmlns="" w="9525">
+                  <a14:hiddenLine xmlns="" xmlns:a14="http://schemas.microsoft.com/office/drawing/2010/main" w="9525">
                     <a:solidFill>
                       <a:srgbClr val="000000"/>
                     </a:solidFill>
@@ -11302,7 +11302,7 @@
               </a:ln>
               <a:extLst>
                 <a:ext uri="{91240B29-F687-4f45-9708-019B960494DF}">
-                  <a14:hiddenLine xmlns:a14="http://schemas.microsoft.com/office/drawing/2010/main" xmlns="" w="9525">
+                  <a14:hiddenLine xmlns="" xmlns:a14="http://schemas.microsoft.com/office/drawing/2010/main" w="9525">
                     <a:solidFill>
                       <a:srgbClr val="000000"/>
                     </a:solidFill>
@@ -11367,7 +11367,7 @@
               </a:ln>
               <a:extLst>
                 <a:ext uri="{91240B29-F687-4f45-9708-019B960494DF}">
-                  <a14:hiddenLine xmlns:a14="http://schemas.microsoft.com/office/drawing/2010/main" xmlns="" w="9525">
+                  <a14:hiddenLine xmlns="" xmlns:a14="http://schemas.microsoft.com/office/drawing/2010/main" w="9525">
                     <a:solidFill>
                       <a:srgbClr val="000000"/>
                     </a:solidFill>
@@ -11457,7 +11457,7 @@
               </a:ln>
               <a:extLst>
                 <a:ext uri="{91240B29-F687-4f45-9708-019B960494DF}">
-                  <a14:hiddenLine xmlns:a14="http://schemas.microsoft.com/office/drawing/2010/main" xmlns="" w="9525">
+                  <a14:hiddenLine xmlns="" xmlns:a14="http://schemas.microsoft.com/office/drawing/2010/main" w="9525">
                     <a:solidFill>
                       <a:srgbClr val="000000"/>
                     </a:solidFill>
@@ -11525,7 +11525,7 @@
               </a:ln>
               <a:extLst>
                 <a:ext uri="{91240B29-F687-4f45-9708-019B960494DF}">
-                  <a14:hiddenLine xmlns:a14="http://schemas.microsoft.com/office/drawing/2010/main" xmlns="" w="9525">
+                  <a14:hiddenLine xmlns="" xmlns:a14="http://schemas.microsoft.com/office/drawing/2010/main" w="9525">
                     <a:solidFill>
                       <a:srgbClr val="000000"/>
                     </a:solidFill>
@@ -11615,7 +11615,7 @@
               </a:ln>
               <a:extLst>
                 <a:ext uri="{91240B29-F687-4f45-9708-019B960494DF}">
-                  <a14:hiddenLine xmlns:a14="http://schemas.microsoft.com/office/drawing/2010/main" xmlns="" w="9525">
+                  <a14:hiddenLine xmlns="" xmlns:a14="http://schemas.microsoft.com/office/drawing/2010/main" w="9525">
                     <a:solidFill>
                       <a:srgbClr val="000000"/>
                     </a:solidFill>
@@ -11683,7 +11683,7 @@
               </a:ln>
               <a:extLst>
                 <a:ext uri="{91240B29-F687-4f45-9708-019B960494DF}">
-                  <a14:hiddenLine xmlns:a14="http://schemas.microsoft.com/office/drawing/2010/main" xmlns="" w="9525">
+                  <a14:hiddenLine xmlns="" xmlns:a14="http://schemas.microsoft.com/office/drawing/2010/main" w="9525">
                     <a:solidFill>
                       <a:srgbClr val="000000"/>
                     </a:solidFill>
@@ -11773,7 +11773,7 @@
               </a:ln>
               <a:extLst>
                 <a:ext uri="{91240B29-F687-4f45-9708-019B960494DF}">
-                  <a14:hiddenLine xmlns:a14="http://schemas.microsoft.com/office/drawing/2010/main" xmlns="" w="9525">
+                  <a14:hiddenLine xmlns="" xmlns:a14="http://schemas.microsoft.com/office/drawing/2010/main" w="9525">
                     <a:solidFill>
                       <a:srgbClr val="000000"/>
                     </a:solidFill>
@@ -11807,7 +11807,7 @@
               </a:ln>
               <a:extLst>
                 <a:ext uri="{91240B29-F687-4f45-9708-019B960494DF}">
-                  <a14:hiddenLine xmlns:a14="http://schemas.microsoft.com/office/drawing/2010/main" xmlns="" w="9525">
+                  <a14:hiddenLine xmlns="" xmlns:a14="http://schemas.microsoft.com/office/drawing/2010/main" w="9525">
                     <a:solidFill>
                       <a:srgbClr val="000000"/>
                     </a:solidFill>
@@ -14007,10 +14007,10 @@
       </p:sp>
       <p:pic>
         <p:nvPicPr>
-          <p:cNvPr id="7" name="Picture 6">
+          <p:cNvPr id="4" name="Picture 3">
             <a:extLst>
               <a:ext uri="{FF2B5EF4-FFF2-40B4-BE49-F238E27FC236}">
-                <a16:creationId xmlns:a16="http://schemas.microsoft.com/office/drawing/2014/main" id="{A7874235-7FC8-4A31-3593-5E92D9CA1A65}"/>
+                <a16:creationId xmlns:a16="http://schemas.microsoft.com/office/drawing/2014/main" id="{08AB629C-8BE1-4A60-A9A2-1A431EAC3104}"/>
               </a:ext>
             </a:extLst>
           </p:cNvPr>
@@ -14027,8 +14027,8 @@
         </p:blipFill>
         <p:spPr>
           <a:xfrm>
-            <a:off x="1320182" y="947737"/>
-            <a:ext cx="9691893" cy="5371783"/>
+            <a:off x="2043297" y="611495"/>
+            <a:ext cx="8105405" cy="6031729"/>
           </a:xfrm>
           <a:prstGeom prst="rect">
             <a:avLst/>

</xml_diff>